<commit_message>
changed some things, especially with model.py's taxation.
</commit_message>
<xml_diff>
--- a/writing/talk/decentralization_tax_presentation.pptx
+++ b/writing/talk/decentralization_tax_presentation.pptx
@@ -16,6 +16,9 @@
     <p:sldId id="264" r:id="rId11"/>
     <p:sldId id="265" r:id="rId12"/>
     <p:sldId id="266" r:id="rId13"/>
+    <p:sldId id="267" r:id="rId14"/>
+    <p:sldId id="268" r:id="rId15"/>
+    <p:sldId id="269" r:id="rId16"/>
   </p:sldIdLst>
   <p:sldSz cx="13004800" cy="9753600"/>
   <p:notesSz cx="7772400" cy="10058400"/>
@@ -1822,7 +1825,7 @@
         <p:spPr>
           <a:xfrm>
             <a:off x="0" y="7406640"/>
-            <a:ext cx="13017960" cy="1709280"/>
+            <a:ext cx="13017960" cy="1351440"/>
           </a:xfrm>
           <a:prstGeom prst="rect">
             <a:avLst/>
@@ -1843,7 +1846,7 @@
                 <a:latin typeface="Arial-BoldMT"/>
                 <a:ea typeface="Arial-BoldMT"/>
               </a:rPr>
-              <a:t>Fair, decentralized exchange networks through quenched local interactions and idiosyncratic trading costs </a:t>
+              <a:t>Fair, decentralized exchange networks through ordinal distance tax </a:t>
             </a:r>
             <a:endParaRPr b="0" lang="en-US" sz="3800" spc="-1" strike="noStrike">
               <a:solidFill>
@@ -1945,13 +1948,13 @@
         </p:nvPicPr>
         <p:blipFill>
           <a:blip r:embed="rId1"/>
-          <a:srcRect l="49917" t="0" r="0" b="0"/>
+          <a:srcRect l="5364" t="60149" r="0" b="20000"/>
           <a:stretch/>
         </p:blipFill>
         <p:spPr>
           <a:xfrm>
-            <a:off x="0" y="731520"/>
-            <a:ext cx="12819600" cy="8686800"/>
+            <a:off x="0" y="3033000"/>
+            <a:ext cx="13004640" cy="3901320"/>
           </a:xfrm>
           <a:prstGeom prst="rect">
             <a:avLst/>
@@ -1961,30 +1964,45 @@
           </a:ln>
         </p:spPr>
       </p:pic>
-      <p:pic>
-        <p:nvPicPr>
-          <p:cNvPr id="79" name="" descr=""/>
-          <p:cNvPicPr/>
+      <p:sp>
+        <p:nvSpPr>
+          <p:cNvPr id="79" name="TextShape 1"/>
+          <p:cNvSpPr txBox="1"/>
           <p:nvPr/>
-        </p:nvPicPr>
-        <p:blipFill>
-          <a:blip r:embed="rId2"/>
-          <a:srcRect l="53084" t="0" r="-1406" b="0"/>
-          <a:stretch/>
-        </p:blipFill>
-        <p:spPr>
-          <a:xfrm>
-            <a:off x="457200" y="514800"/>
-            <a:ext cx="12547080" cy="8812080"/>
-          </a:xfrm>
-          <a:prstGeom prst="rect">
-            <a:avLst/>
-          </a:prstGeom>
+        </p:nvSpPr>
+        <p:spPr>
+          <a:xfrm>
+            <a:off x="752760" y="852480"/>
+            <a:ext cx="11261880" cy="572040"/>
+          </a:xfrm>
+          <a:prstGeom prst="rect">
+            <a:avLst/>
+          </a:prstGeom>
+          <a:noFill/>
           <a:ln>
             <a:noFill/>
           </a:ln>
         </p:spPr>
-      </p:pic>
+        <p:txBody>
+          <a:bodyPr lIns="90000" rIns="90000" tIns="45000" bIns="45000"/>
+          <a:p>
+            <a:pPr algn="ctr"/>
+            <a:r>
+              <a:rPr b="1" lang="en-US" sz="3400" spc="-1" strike="noStrike">
+                <a:solidFill>
+                  <a:srgbClr val="164e86"/>
+                </a:solidFill>
+                <a:latin typeface="Arial-BoldMT"/>
+                <a:ea typeface="Arial-BoldMT"/>
+              </a:rPr>
+              <a:t>Results: Slightly Unequal Costs With Tax</a:t>
+            </a:r>
+            <a:endParaRPr b="0" lang="en-US" sz="3400" spc="-1" strike="noStrike">
+              <a:latin typeface="Arial"/>
+            </a:endParaRPr>
+          </a:p>
+        </p:txBody>
+      </p:sp>
     </p:spTree>
   </p:cSld>
   <mc:AlternateContent>
@@ -2028,6 +2046,312 @@
 <file path=ppt/slides/slide11.xml><?xml version="1.0" encoding="utf-8"?>
 <p:sld xmlns:a="http://schemas.openxmlformats.org/drawingml/2006/main" xmlns:p="http://schemas.openxmlformats.org/presentationml/2006/main" xmlns:r="http://schemas.openxmlformats.org/officeDocument/2006/relationships" xmlns:p14="http://schemas.microsoft.com/office/powerpoint/2010/main" xmlns:p15="http://schemas.microsoft.com/office/powerpoint/2012/main" xmlns:mc="http://schemas.openxmlformats.org/markup-compatibility/2006">
   <p:cSld>
+    <p:spTree>
+      <p:nvGrpSpPr>
+        <p:cNvPr id="1" name=""/>
+        <p:cNvGrpSpPr/>
+        <p:nvPr/>
+      </p:nvGrpSpPr>
+      <p:grpSpPr>
+        <a:xfrm>
+          <a:off x="0" y="0"/>
+          <a:ext cx="0" cy="0"/>
+          <a:chOff x="0" y="0"/>
+          <a:chExt cx="0" cy="0"/>
+        </a:xfrm>
+      </p:grpSpPr>
+      <p:pic>
+        <p:nvPicPr>
+          <p:cNvPr id="80" name="" descr=""/>
+          <p:cNvPicPr/>
+          <p:nvPr/>
+        </p:nvPicPr>
+        <p:blipFill>
+          <a:blip r:embed="rId1"/>
+          <a:srcRect l="5364" t="79995" r="0" b="-2325"/>
+          <a:stretch/>
+        </p:blipFill>
+        <p:spPr>
+          <a:xfrm>
+            <a:off x="0" y="2926440"/>
+            <a:ext cx="13004640" cy="4388760"/>
+          </a:xfrm>
+          <a:prstGeom prst="rect">
+            <a:avLst/>
+          </a:prstGeom>
+          <a:ln>
+            <a:noFill/>
+          </a:ln>
+        </p:spPr>
+      </p:pic>
+      <p:sp>
+        <p:nvSpPr>
+          <p:cNvPr id="81" name="TextShape 1"/>
+          <p:cNvSpPr txBox="1"/>
+          <p:nvPr/>
+        </p:nvSpPr>
+        <p:spPr>
+          <a:xfrm>
+            <a:off x="752760" y="852480"/>
+            <a:ext cx="11261880" cy="572040"/>
+          </a:xfrm>
+          <a:prstGeom prst="rect">
+            <a:avLst/>
+          </a:prstGeom>
+          <a:noFill/>
+          <a:ln>
+            <a:noFill/>
+          </a:ln>
+        </p:spPr>
+        <p:txBody>
+          <a:bodyPr lIns="90000" rIns="90000" tIns="45000" bIns="45000"/>
+          <a:p>
+            <a:pPr algn="ctr"/>
+            <a:r>
+              <a:rPr b="1" lang="en-US" sz="3400" spc="-1" strike="noStrike">
+                <a:solidFill>
+                  <a:srgbClr val="164e86"/>
+                </a:solidFill>
+                <a:latin typeface="Arial-BoldMT"/>
+                <a:ea typeface="Arial-BoldMT"/>
+              </a:rPr>
+              <a:t>Results: Very Unequal Costs With Tax</a:t>
+            </a:r>
+            <a:endParaRPr b="0" lang="en-US" sz="3400" spc="-1" strike="noStrike">
+              <a:latin typeface="Arial"/>
+            </a:endParaRPr>
+          </a:p>
+        </p:txBody>
+      </p:sp>
+    </p:spTree>
+  </p:cSld>
+  <mc:AlternateContent>
+    <mc:Choice Requires="p14">
+      <p:transition spd="slow" p14:dur="2000"/>
+    </mc:Choice>
+    <mc:Fallback>
+      <p:transition spd="slow"/>
+    </mc:Fallback>
+  </mc:AlternateContent>
+  <p:timing>
+    <p:tnLst>
+      <p:par>
+        <p:cTn id="21" dur="indefinite" restart="never" nodeType="tmRoot">
+          <p:childTnLst>
+            <p:seq>
+              <p:cTn id="22" dur="indefinite" nodeType="mainSeq"/>
+              <p:prevCondLst>
+                <p:cond delay="0" evt="onPrev">
+                  <p:tgtEl>
+                    <p:sldTgt/>
+                  </p:tgtEl>
+                </p:cond>
+              </p:prevCondLst>
+              <p:nextCondLst>
+                <p:cond delay="0" evt="onNext">
+                  <p:tgtEl>
+                    <p:sldTgt/>
+                  </p:tgtEl>
+                </p:cond>
+              </p:nextCondLst>
+            </p:seq>
+          </p:childTnLst>
+        </p:cTn>
+      </p:par>
+    </p:tnLst>
+  </p:timing>
+</p:sld>
+</file>
+
+<file path=ppt/slides/slide12.xml><?xml version="1.0" encoding="utf-8"?>
+<p:sld xmlns:a="http://schemas.openxmlformats.org/drawingml/2006/main" xmlns:p="http://schemas.openxmlformats.org/presentationml/2006/main" xmlns:r="http://schemas.openxmlformats.org/officeDocument/2006/relationships" xmlns:p14="http://schemas.microsoft.com/office/powerpoint/2010/main" xmlns:p15="http://schemas.microsoft.com/office/powerpoint/2012/main" xmlns:mc="http://schemas.openxmlformats.org/markup-compatibility/2006">
+  <p:cSld>
+    <p:spTree>
+      <p:nvGrpSpPr>
+        <p:cNvPr id="1" name=""/>
+        <p:cNvGrpSpPr/>
+        <p:nvPr/>
+      </p:nvGrpSpPr>
+      <p:grpSpPr>
+        <a:xfrm>
+          <a:off x="0" y="0"/>
+          <a:ext cx="0" cy="0"/>
+          <a:chOff x="0" y="0"/>
+          <a:chExt cx="0" cy="0"/>
+        </a:xfrm>
+      </p:grpSpPr>
+      <p:pic>
+        <p:nvPicPr>
+          <p:cNvPr id="82" name="" descr=""/>
+          <p:cNvPicPr/>
+          <p:nvPr/>
+        </p:nvPicPr>
+        <p:blipFill>
+          <a:blip r:embed="rId1"/>
+          <a:srcRect l="1753" t="0" r="50077" b="0"/>
+          <a:stretch/>
+        </p:blipFill>
+        <p:spPr>
+          <a:xfrm>
+            <a:off x="457200" y="548640"/>
+            <a:ext cx="12547440" cy="8840160"/>
+          </a:xfrm>
+          <a:prstGeom prst="rect">
+            <a:avLst/>
+          </a:prstGeom>
+          <a:ln>
+            <a:noFill/>
+          </a:ln>
+        </p:spPr>
+      </p:pic>
+    </p:spTree>
+  </p:cSld>
+  <mc:AlternateContent>
+    <mc:Choice Requires="p14">
+      <p:transition spd="slow" p14:dur="2000"/>
+    </mc:Choice>
+    <mc:Fallback>
+      <p:transition spd="slow"/>
+    </mc:Fallback>
+  </mc:AlternateContent>
+  <p:timing>
+    <p:tnLst>
+      <p:par>
+        <p:cTn id="23" dur="indefinite" restart="never" nodeType="tmRoot">
+          <p:childTnLst>
+            <p:seq>
+              <p:cTn id="24" dur="indefinite" nodeType="mainSeq"/>
+              <p:prevCondLst>
+                <p:cond delay="0" evt="onPrev">
+                  <p:tgtEl>
+                    <p:sldTgt/>
+                  </p:tgtEl>
+                </p:cond>
+              </p:prevCondLst>
+              <p:nextCondLst>
+                <p:cond delay="0" evt="onNext">
+                  <p:tgtEl>
+                    <p:sldTgt/>
+                  </p:tgtEl>
+                </p:cond>
+              </p:nextCondLst>
+            </p:seq>
+          </p:childTnLst>
+        </p:cTn>
+      </p:par>
+    </p:tnLst>
+  </p:timing>
+</p:sld>
+</file>
+
+<file path=ppt/slides/slide13.xml><?xml version="1.0" encoding="utf-8"?>
+<p:sld xmlns:a="http://schemas.openxmlformats.org/drawingml/2006/main" xmlns:p="http://schemas.openxmlformats.org/presentationml/2006/main" xmlns:r="http://schemas.openxmlformats.org/officeDocument/2006/relationships" xmlns:p14="http://schemas.microsoft.com/office/powerpoint/2010/main" xmlns:p15="http://schemas.microsoft.com/office/powerpoint/2012/main" xmlns:mc="http://schemas.openxmlformats.org/markup-compatibility/2006">
+  <p:cSld>
+    <p:spTree>
+      <p:nvGrpSpPr>
+        <p:cNvPr id="1" name=""/>
+        <p:cNvGrpSpPr/>
+        <p:nvPr/>
+      </p:nvGrpSpPr>
+      <p:grpSpPr>
+        <a:xfrm>
+          <a:off x="0" y="0"/>
+          <a:ext cx="0" cy="0"/>
+          <a:chOff x="0" y="0"/>
+          <a:chExt cx="0" cy="0"/>
+        </a:xfrm>
+      </p:grpSpPr>
+      <p:pic>
+        <p:nvPicPr>
+          <p:cNvPr id="83" name="" descr=""/>
+          <p:cNvPicPr/>
+          <p:nvPr/>
+        </p:nvPicPr>
+        <p:blipFill>
+          <a:blip r:embed="rId1"/>
+          <a:srcRect l="49917" t="0" r="0" b="0"/>
+          <a:stretch/>
+        </p:blipFill>
+        <p:spPr>
+          <a:xfrm>
+            <a:off x="0" y="731520"/>
+            <a:ext cx="12819600" cy="8686800"/>
+          </a:xfrm>
+          <a:prstGeom prst="rect">
+            <a:avLst/>
+          </a:prstGeom>
+          <a:ln>
+            <a:noFill/>
+          </a:ln>
+        </p:spPr>
+      </p:pic>
+      <p:pic>
+        <p:nvPicPr>
+          <p:cNvPr id="84" name="" descr=""/>
+          <p:cNvPicPr/>
+          <p:nvPr/>
+        </p:nvPicPr>
+        <p:blipFill>
+          <a:blip r:embed="rId2"/>
+          <a:srcRect l="53084" t="0" r="-1406" b="0"/>
+          <a:stretch/>
+        </p:blipFill>
+        <p:spPr>
+          <a:xfrm>
+            <a:off x="457200" y="514800"/>
+            <a:ext cx="12547080" cy="8812080"/>
+          </a:xfrm>
+          <a:prstGeom prst="rect">
+            <a:avLst/>
+          </a:prstGeom>
+          <a:ln>
+            <a:noFill/>
+          </a:ln>
+        </p:spPr>
+      </p:pic>
+    </p:spTree>
+  </p:cSld>
+  <mc:AlternateContent>
+    <mc:Choice Requires="p14">
+      <p:transition spd="slow" p14:dur="2000"/>
+    </mc:Choice>
+    <mc:Fallback>
+      <p:transition spd="slow"/>
+    </mc:Fallback>
+  </mc:AlternateContent>
+  <p:timing>
+    <p:tnLst>
+      <p:par>
+        <p:cTn id="25" dur="indefinite" restart="never" nodeType="tmRoot">
+          <p:childTnLst>
+            <p:seq>
+              <p:cTn id="26" dur="indefinite" nodeType="mainSeq"/>
+              <p:prevCondLst>
+                <p:cond delay="0" evt="onPrev">
+                  <p:tgtEl>
+                    <p:sldTgt/>
+                  </p:tgtEl>
+                </p:cond>
+              </p:prevCondLst>
+              <p:nextCondLst>
+                <p:cond delay="0" evt="onNext">
+                  <p:tgtEl>
+                    <p:sldTgt/>
+                  </p:tgtEl>
+                </p:cond>
+              </p:nextCondLst>
+            </p:seq>
+          </p:childTnLst>
+        </p:cTn>
+      </p:par>
+    </p:tnLst>
+  </p:timing>
+</p:sld>
+</file>
+
+<file path=ppt/slides/slide14.xml><?xml version="1.0" encoding="utf-8"?>
+<p:sld xmlns:a="http://schemas.openxmlformats.org/drawingml/2006/main" xmlns:p="http://schemas.openxmlformats.org/presentationml/2006/main" xmlns:r="http://schemas.openxmlformats.org/officeDocument/2006/relationships" xmlns:p14="http://schemas.microsoft.com/office/powerpoint/2010/main" xmlns:p15="http://schemas.microsoft.com/office/powerpoint/2012/main" xmlns:mc="http://schemas.openxmlformats.org/markup-compatibility/2006">
+  <p:cSld>
     <p:bg>
       <p:bgPr>
         <a:solidFill>
@@ -2051,7 +2375,7 @@
       </p:grpSpPr>
       <p:sp>
         <p:nvSpPr>
-          <p:cNvPr id="80" name="TextShape 1"/>
+          <p:cNvPr id="85" name="TextShape 1"/>
           <p:cNvSpPr txBox="1"/>
           <p:nvPr/>
         </p:nvSpPr>
@@ -2090,7 +2414,7 @@
       </p:sp>
       <p:sp>
         <p:nvSpPr>
-          <p:cNvPr id="81" name="TextShape 2"/>
+          <p:cNvPr id="86" name="TextShape 2"/>
           <p:cNvSpPr txBox="1"/>
           <p:nvPr/>
         </p:nvSpPr>
@@ -2249,10 +2573,10 @@
   <p:timing>
     <p:tnLst>
       <p:par>
-        <p:cTn id="21" dur="indefinite" restart="never" nodeType="tmRoot">
+        <p:cTn id="27" dur="indefinite" restart="never" nodeType="tmRoot">
           <p:childTnLst>
             <p:seq>
-              <p:cTn id="22" dur="indefinite" nodeType="mainSeq"/>
+              <p:cTn id="28" dur="indefinite" nodeType="mainSeq"/>
               <p:prevCondLst>
                 <p:cond delay="0" evt="onPrev">
                   <p:tgtEl>
@@ -2691,47 +3015,9 @@
           <a:chExt cx="0" cy="0"/>
         </a:xfrm>
       </p:grpSpPr>
-      <p:sp>
-        <p:nvSpPr>
-          <p:cNvPr id="51" name="TextShape 1"/>
-          <p:cNvSpPr txBox="1"/>
-          <p:nvPr/>
-        </p:nvSpPr>
-        <p:spPr>
-          <a:xfrm>
-            <a:off x="752040" y="851760"/>
-            <a:ext cx="11261880" cy="572040"/>
-          </a:xfrm>
-          <a:prstGeom prst="rect">
-            <a:avLst/>
-          </a:prstGeom>
-          <a:noFill/>
-          <a:ln>
-            <a:noFill/>
-          </a:ln>
-        </p:spPr>
-        <p:txBody>
-          <a:bodyPr lIns="90000" rIns="90000" tIns="45000" bIns="45000"/>
-          <a:p>
-            <a:r>
-              <a:rPr b="1" lang="en-US" sz="3400" spc="-1" strike="noStrike">
-                <a:solidFill>
-                  <a:srgbClr val="164e86"/>
-                </a:solidFill>
-                <a:latin typeface="Arial-BoldMT"/>
-                <a:ea typeface="Arial-BoldMT"/>
-              </a:rPr>
-              <a:t>Historical motivation: the rise of Amazon</a:t>
-            </a:r>
-            <a:endParaRPr b="0" lang="en-US" sz="3400" spc="-1" strike="noStrike">
-              <a:latin typeface="Arial"/>
-            </a:endParaRPr>
-          </a:p>
-        </p:txBody>
-      </p:sp>
       <p:pic>
         <p:nvPicPr>
-          <p:cNvPr id="52" name="" descr=""/>
+          <p:cNvPr id="51" name="" descr=""/>
           <p:cNvPicPr/>
           <p:nvPr/>
         </p:nvPicPr>
@@ -2741,8 +3027,8 @@
         </p:blipFill>
         <p:spPr>
           <a:xfrm>
-            <a:off x="2158200" y="5361120"/>
-            <a:ext cx="7808760" cy="4392360"/>
+            <a:off x="3621240" y="6380280"/>
+            <a:ext cx="5888520" cy="3312360"/>
           </a:xfrm>
           <a:prstGeom prst="rect">
             <a:avLst/>
@@ -2759,14 +3045,14 @@
       </p:pic>
       <p:sp>
         <p:nvSpPr>
-          <p:cNvPr id="53" name="TextShape 2"/>
+          <p:cNvPr id="52" name="TextShape 1"/>
           <p:cNvSpPr txBox="1"/>
           <p:nvPr/>
         </p:nvSpPr>
         <p:spPr>
           <a:xfrm>
-            <a:off x="595080" y="1765800"/>
-            <a:ext cx="12217680" cy="3871440"/>
+            <a:off x="752040" y="851760"/>
+            <a:ext cx="11261880" cy="572040"/>
           </a:xfrm>
           <a:prstGeom prst="rect">
             <a:avLst/>
@@ -2780,6 +3066,44 @@
           <a:bodyPr lIns="90000" rIns="90000" tIns="45000" bIns="45000"/>
           <a:p>
             <a:r>
+              <a:rPr b="1" lang="en-US" sz="3400" spc="-1" strike="noStrike">
+                <a:solidFill>
+                  <a:srgbClr val="164e86"/>
+                </a:solidFill>
+                <a:latin typeface="Arial-BoldMT"/>
+                <a:ea typeface="Arial-BoldMT"/>
+              </a:rPr>
+              <a:t>Historical motivation: the rise of Amazon</a:t>
+            </a:r>
+            <a:endParaRPr b="0" lang="en-US" sz="3400" spc="-1" strike="noStrike">
+              <a:latin typeface="Arial"/>
+            </a:endParaRPr>
+          </a:p>
+        </p:txBody>
+      </p:sp>
+      <p:sp>
+        <p:nvSpPr>
+          <p:cNvPr id="53" name="TextShape 2"/>
+          <p:cNvSpPr txBox="1"/>
+          <p:nvPr/>
+        </p:nvSpPr>
+        <p:spPr>
+          <a:xfrm>
+            <a:off x="595080" y="1765800"/>
+            <a:ext cx="12217680" cy="4132440"/>
+          </a:xfrm>
+          <a:prstGeom prst="rect">
+            <a:avLst/>
+          </a:prstGeom>
+          <a:noFill/>
+          <a:ln>
+            <a:noFill/>
+          </a:ln>
+        </p:spPr>
+        <p:txBody>
+          <a:bodyPr lIns="90000" rIns="90000" tIns="45000" bIns="45000"/>
+          <a:p>
+            <a:r>
               <a:rPr b="0" lang="en-US" sz="2500" spc="-1" strike="noStrike">
                 <a:solidFill>
                   <a:srgbClr val="000000"/>
@@ -2787,7 +3111,27 @@
                 <a:latin typeface="ArialMT"/>
                 <a:ea typeface="ArialMT"/>
               </a:rPr>
-              <a:t>Invention of new distribution technology, such as cargo containers and internet stores, decreases transaction costs. Decreased transaction costs are:</a:t>
+              <a:t>Invention of new distribution technology, such as cargo containers and internet stores, decreases transaction costs. </a:t>
+            </a:r>
+            <a:endParaRPr b="0" lang="en-US" sz="2500" spc="-1" strike="noStrike">
+              <a:latin typeface="Arial"/>
+            </a:endParaRPr>
+          </a:p>
+          <a:p>
+            <a:endParaRPr b="0" lang="en-US" sz="2500" spc="-1" strike="noStrike">
+              <a:latin typeface="Arial"/>
+            </a:endParaRPr>
+          </a:p>
+          <a:p>
+            <a:r>
+              <a:rPr b="0" lang="en-US" sz="2500" spc="-1" strike="noStrike">
+                <a:solidFill>
+                  <a:srgbClr val="000000"/>
+                </a:solidFill>
+                <a:latin typeface="ArialMT"/>
+                <a:ea typeface="ArialMT"/>
+              </a:rPr>
+              <a:t>Decreased transaction costs are:</a:t>
             </a:r>
             <a:endParaRPr b="0" lang="en-US" sz="2500" spc="-1" strike="noStrike">
               <a:latin typeface="Arial"/>
@@ -2846,6 +3190,22 @@
             </a:endParaRPr>
           </a:p>
           <a:p>
+            <a:pPr marL="216000" indent="-216000">
+              <a:spcBef>
+                <a:spcPts val="499"/>
+              </a:spcBef>
+              <a:buClr>
+                <a:srgbClr val="000000"/>
+              </a:buClr>
+              <a:buSzPct val="45000"/>
+              <a:buFont typeface="Wingdings" charset="2"/>
+              <a:buChar char=""/>
+            </a:pPr>
+            <a:endParaRPr b="0" lang="en-US" sz="2500" spc="-1" strike="noStrike">
+              <a:latin typeface="Arial"/>
+            </a:endParaRPr>
+          </a:p>
+          <a:p>
             <a:r>
               <a:rPr b="0" lang="en-US" sz="2500" spc="-1" strike="noStrike">
                 <a:solidFill>
@@ -2873,14 +3233,24 @@
               <a:buChar char="•"/>
             </a:pPr>
             <a:r>
-              <a:rPr b="0" lang="en-US" sz="2500" spc="-1" strike="noStrike">
+              <a:rPr b="1" lang="en-US" sz="2500" spc="-1" strike="noStrike">
                 <a:solidFill>
                   <a:srgbClr val="000000"/>
                 </a:solidFill>
                 <a:latin typeface="ArialMT"/>
                 <a:ea typeface="ArialMT"/>
               </a:rPr>
-              <a:t>Centralization of firms, especially with network economies</a:t>
+              <a:t>Centralization</a:t>
+            </a:r>
+            <a:r>
+              <a:rPr b="0" lang="en-US" sz="2500" spc="-1" strike="noStrike">
+                <a:solidFill>
+                  <a:srgbClr val="000000"/>
+                </a:solidFill>
+                <a:latin typeface="ArialMT"/>
+                <a:ea typeface="ArialMT"/>
+              </a:rPr>
+              <a:t> of firms, especially with network economies</a:t>
             </a:r>
             <a:endParaRPr b="0" lang="en-US" sz="2500" spc="-1" strike="noStrike">
               <a:latin typeface="Arial"/>
@@ -2899,14 +3269,24 @@
               <a:buChar char="•"/>
             </a:pPr>
             <a:r>
-              <a:rPr b="0" lang="en-US" sz="2500" spc="-1" strike="noStrike">
+              <a:rPr b="1" lang="en-US" sz="2500" spc="-1" strike="noStrike">
                 <a:solidFill>
                   <a:srgbClr val="000000"/>
                 </a:solidFill>
                 <a:latin typeface="ArialMT"/>
                 <a:ea typeface="ArialMT"/>
               </a:rPr>
-              <a:t>Monopolistic and anti-competitive behavior</a:t>
+              <a:t>Monopolistic</a:t>
+            </a:r>
+            <a:r>
+              <a:rPr b="0" lang="en-US" sz="2500" spc="-1" strike="noStrike">
+                <a:solidFill>
+                  <a:srgbClr val="000000"/>
+                </a:solidFill>
+                <a:latin typeface="ArialMT"/>
+                <a:ea typeface="ArialMT"/>
+              </a:rPr>
+              <a:t> and anti-competitive behavior</a:t>
             </a:r>
             <a:endParaRPr b="0" lang="en-US" sz="2500" spc="-1" strike="noStrike">
               <a:latin typeface="Arial"/>
@@ -2926,15 +3306,17 @@
         </p:blipFill>
         <p:spPr>
           <a:xfrm>
-            <a:off x="5432760" y="7406640"/>
-            <a:ext cx="1333800" cy="485640"/>
+            <a:off x="5669280" y="7680960"/>
+            <a:ext cx="1836000" cy="668520"/>
           </a:xfrm>
           <a:prstGeom prst="rect">
             <a:avLst/>
           </a:prstGeom>
           <a:ln w="12600">
             <a:solidFill>
-              <a:srgbClr val="000000"/>
+              <a:srgbClr val="000000">
+                <a:alpha val="0"/>
+              </a:srgbClr>
             </a:solidFill>
             <a:miter/>
           </a:ln>
@@ -3312,7 +3694,7 @@
                 <a:latin typeface="Arial-BoldMT"/>
                 <a:ea typeface="Arial-BoldMT"/>
               </a:rPr>
-              <a:t>A modern decentralized trade-network: basic idea</a:t>
+              <a:t>A modern decentralized trade-network: solution</a:t>
             </a:r>
             <a:endParaRPr b="0" lang="en-US" sz="3400" spc="-1" strike="noStrike">
               <a:latin typeface="Arial"/>
@@ -3358,8 +3740,8 @@
         </p:blipFill>
         <p:spPr>
           <a:xfrm>
-            <a:off x="6675120" y="6298560"/>
-            <a:ext cx="971640" cy="1582560"/>
+            <a:off x="4206240" y="7702200"/>
+            <a:ext cx="1243800" cy="1807560"/>
           </a:xfrm>
           <a:prstGeom prst="rect">
             <a:avLst/>
@@ -3384,7 +3766,7 @@
         </p:blipFill>
         <p:spPr>
           <a:xfrm>
-            <a:off x="4206240" y="7702200"/>
+            <a:off x="11100600" y="5269320"/>
             <a:ext cx="1243800" cy="1807560"/>
           </a:xfrm>
           <a:prstGeom prst="rect">
@@ -3410,7 +3792,7 @@
         </p:blipFill>
         <p:spPr>
           <a:xfrm>
-            <a:off x="11100600" y="5269320"/>
+            <a:off x="36360" y="5029200"/>
             <a:ext cx="1243800" cy="1807560"/>
           </a:xfrm>
           <a:prstGeom prst="rect">
@@ -3424,35 +3806,9 @@
           </a:ln>
         </p:spPr>
       </p:pic>
-      <p:pic>
-        <p:nvPicPr>
-          <p:cNvPr id="62" name="" descr=""/>
-          <p:cNvPicPr/>
-          <p:nvPr/>
-        </p:nvPicPr>
-        <p:blipFill>
-          <a:blip r:embed="rId5"/>
-          <a:stretch/>
-        </p:blipFill>
-        <p:spPr>
-          <a:xfrm>
-            <a:off x="36360" y="5029200"/>
-            <a:ext cx="1243800" cy="1807560"/>
-          </a:xfrm>
-          <a:prstGeom prst="rect">
-            <a:avLst/>
-          </a:prstGeom>
-          <a:ln w="12600">
-            <a:solidFill>
-              <a:srgbClr val="000000"/>
-            </a:solidFill>
-            <a:miter/>
-          </a:ln>
-        </p:spPr>
-      </p:pic>
-      <p:sp>
-        <p:nvSpPr>
-          <p:cNvPr id="63" name="Line 2"/>
+      <p:sp>
+        <p:nvSpPr>
+          <p:cNvPr id="62" name="Line 2"/>
           <p:cNvSpPr/>
           <p:nvPr/>
         </p:nvSpPr>
@@ -3482,7 +3838,7 @@
       </p:sp>
       <p:sp>
         <p:nvSpPr>
-          <p:cNvPr id="64" name="Line 3"/>
+          <p:cNvPr id="63" name="Line 3"/>
           <p:cNvSpPr/>
           <p:nvPr/>
         </p:nvSpPr>
@@ -3512,7 +3868,7 @@
       </p:sp>
       <p:sp>
         <p:nvSpPr>
-          <p:cNvPr id="65" name="Line 4"/>
+          <p:cNvPr id="64" name="Line 4"/>
           <p:cNvSpPr/>
           <p:nvPr/>
         </p:nvSpPr>
@@ -3542,7 +3898,7 @@
       </p:sp>
       <p:sp>
         <p:nvSpPr>
-          <p:cNvPr id="66" name="TextShape 5"/>
+          <p:cNvPr id="65" name="TextShape 5"/>
           <p:cNvSpPr txBox="1"/>
           <p:nvPr/>
         </p:nvSpPr>
@@ -3586,7 +3942,7 @@
       </p:sp>
       <p:sp>
         <p:nvSpPr>
-          <p:cNvPr id="67" name="TextShape 6"/>
+          <p:cNvPr id="66" name="TextShape 6"/>
           <p:cNvSpPr txBox="1"/>
           <p:nvPr/>
         </p:nvSpPr>
@@ -3630,7 +3986,7 @@
       </p:sp>
       <p:sp>
         <p:nvSpPr>
-          <p:cNvPr id="68" name="TextShape 7"/>
+          <p:cNvPr id="67" name="TextShape 7"/>
           <p:cNvSpPr txBox="1"/>
           <p:nvPr/>
         </p:nvSpPr>
@@ -3674,7 +4030,7 @@
       </p:sp>
       <p:sp>
         <p:nvSpPr>
-          <p:cNvPr id="69" name="TextShape 8"/>
+          <p:cNvPr id="68" name="TextShape 8"/>
           <p:cNvSpPr txBox="1"/>
           <p:nvPr/>
         </p:nvSpPr>
@@ -3693,21 +4049,6 @@
         </p:spPr>
         <p:txBody>
           <a:bodyPr lIns="90000" rIns="90000" tIns="45000" bIns="45000"/>
-          <a:p>
-            <a:r>
-              <a:rPr b="0" lang="en-US" sz="2500" spc="-1" strike="noStrike">
-                <a:solidFill>
-                  <a:srgbClr val="000000"/>
-                </a:solidFill>
-                <a:latin typeface="ArialMT"/>
-                <a:ea typeface="ArialMT"/>
-              </a:rPr>
-              <a:t>Solution:</a:t>
-            </a:r>
-            <a:endParaRPr b="0" lang="en-US" sz="2500" spc="-1" strike="noStrike">
-              <a:latin typeface="Arial"/>
-            </a:endParaRPr>
-          </a:p>
           <a:p>
             <a:r>
               <a:rPr b="0" lang="en-US" sz="2500" spc="-1" strike="noStrike">
@@ -3817,35 +4158,29 @@
           </a:p>
         </p:txBody>
       </p:sp>
-      <mc:AlternateContent>
-        <mc:Choice xmlns:a14="http://schemas.microsoft.com/office/drawing/2010/main" Requires="a14">
-          <p:sp>
-            <p:nvSpPr>
-              <p:cNvPr id="70" name="Formula 9"/>
-              <p:cNvSpPr txBox="1"/>
-              <p:nvPr/>
-            </p:nvSpPr>
-            <p:spPr>
-              <a:xfrm>
-                <a:off x="6185880" y="4582440"/>
-                <a:ext cx="719640" cy="359640"/>
-              </a:xfrm>
-              <a:prstGeom prst="rect">
-                <a:avLst/>
-              </a:prstGeom>
-            </p:spPr>
-            <p:txBody>
-              <a:bodyPr/>
-              <a:p>
-                <a14:m>
-                  <m:oMath xmlns:m="http://schemas.openxmlformats.org/officeDocument/2006/math"/>
-                </a14:m>
-              </a:p>
-            </p:txBody>
-          </p:sp>
-        </mc:Choice>
-        <mc:Fallback/>
-      </mc:AlternateContent>
+      <p:pic>
+        <p:nvPicPr>
+          <p:cNvPr id="69" name="" descr=""/>
+          <p:cNvPicPr/>
+          <p:nvPr/>
+        </p:nvPicPr>
+        <p:blipFill>
+          <a:blip r:embed="rId5"/>
+          <a:stretch/>
+        </p:blipFill>
+        <p:spPr>
+          <a:xfrm>
+            <a:off x="6583680" y="5852160"/>
+            <a:ext cx="1168560" cy="2294640"/>
+          </a:xfrm>
+          <a:prstGeom prst="rect">
+            <a:avLst/>
+          </a:prstGeom>
+          <a:ln>
+            <a:noFill/>
+          </a:ln>
+        </p:spPr>
+      </p:pic>
     </p:spTree>
   </p:cSld>
   <mc:AlternateContent>
@@ -3912,7 +4247,7 @@
       </p:grpSpPr>
       <p:sp>
         <p:nvSpPr>
-          <p:cNvPr id="71" name="TextShape 1"/>
+          <p:cNvPr id="70" name="TextShape 1"/>
           <p:cNvSpPr txBox="1"/>
           <p:nvPr/>
         </p:nvSpPr>
@@ -3941,7 +4276,7 @@
                 <a:latin typeface="Arial-BoldMT"/>
                 <a:ea typeface="Arial-BoldMT"/>
               </a:rPr>
-              <a:t>Model</a:t>
+              <a:t>A modern decentralized trade-network: model</a:t>
             </a:r>
             <a:endParaRPr b="0" lang="en-US" sz="3400" spc="-1" strike="noStrike">
               <a:latin typeface="Arial"/>
@@ -3951,14 +4286,14 @@
       </p:sp>
       <p:sp>
         <p:nvSpPr>
-          <p:cNvPr id="72" name="TextShape 2"/>
+          <p:cNvPr id="71" name="TextShape 2"/>
           <p:cNvSpPr txBox="1"/>
           <p:nvPr/>
         </p:nvSpPr>
         <p:spPr>
           <a:xfrm>
             <a:off x="595080" y="1749960"/>
-            <a:ext cx="12392280" cy="4783680"/>
+            <a:ext cx="11840760" cy="4783680"/>
           </a:xfrm>
           <a:prstGeom prst="rect">
             <a:avLst/>
@@ -4049,8 +4384,18 @@
                 <a:srgbClr val="000000"/>
               </a:buClr>
               <a:buFont typeface="StarSymbol"/>
-              <a:buAutoNum type="arabicParenR"/>
+              <a:buAutoNum type="alphaLcParenR"/>
             </a:pPr>
+            <a:r>
+              <a:rPr b="0" lang="en-US" sz="2500" spc="-1" strike="noStrike">
+                <a:solidFill>
+                  <a:srgbClr val="000000"/>
+                </a:solidFill>
+                <a:latin typeface="ArialMT"/>
+                <a:ea typeface="ArialMT"/>
+              </a:rPr>
+              <a:t> </a:t>
+            </a:r>
             <a:r>
               <a:rPr b="0" lang="en-US" sz="2500" spc="-1" strike="noStrike">
                 <a:solidFill>
@@ -4074,8 +4419,18 @@
                 <a:srgbClr val="000000"/>
               </a:buClr>
               <a:buFont typeface="StarSymbol"/>
-              <a:buAutoNum type="arabicParenR"/>
+              <a:buAutoNum type="alphaLcParenR"/>
             </a:pPr>
+            <a:r>
+              <a:rPr b="0" lang="en-US" sz="2500" spc="-1" strike="noStrike">
+                <a:solidFill>
+                  <a:srgbClr val="000000"/>
+                </a:solidFill>
+                <a:latin typeface="ArialMT"/>
+                <a:ea typeface="ArialMT"/>
+              </a:rPr>
+              <a:t> </a:t>
+            </a:r>
             <a:r>
               <a:rPr b="0" lang="en-US" sz="2500" spc="-1" strike="noStrike">
                 <a:solidFill>
@@ -4291,19 +4646,19 @@
       </p:grpSpPr>
       <p:pic>
         <p:nvPicPr>
-          <p:cNvPr id="73" name="" descr=""/>
+          <p:cNvPr id="72" name="" descr=""/>
           <p:cNvPicPr/>
           <p:nvPr/>
         </p:nvPicPr>
         <p:blipFill>
           <a:blip r:embed="rId1"/>
-          <a:srcRect l="5364" t="-164" r="0" b="60159"/>
+          <a:srcRect l="5364" t="-164" r="0" b="80005"/>
           <a:stretch/>
         </p:blipFill>
         <p:spPr>
           <a:xfrm>
-            <a:off x="0" y="1889640"/>
-            <a:ext cx="13004640" cy="7863840"/>
+            <a:off x="0" y="2987280"/>
+            <a:ext cx="13004640" cy="3962160"/>
           </a:xfrm>
           <a:prstGeom prst="rect">
             <a:avLst/>
@@ -4315,7 +4670,7 @@
       </p:pic>
       <p:sp>
         <p:nvSpPr>
-          <p:cNvPr id="74" name="TextShape 1"/>
+          <p:cNvPr id="73" name="TextShape 1"/>
           <p:cNvSpPr txBox="1"/>
           <p:nvPr/>
         </p:nvSpPr>
@@ -4344,7 +4699,7 @@
                 <a:latin typeface="Arial-BoldMT"/>
                 <a:ea typeface="Arial-BoldMT"/>
               </a:rPr>
-              <a:t>Results: Without Tax</a:t>
+              <a:t>Results: Equal Costs Without Tax</a:t>
             </a:r>
             <a:endParaRPr b="0" lang="en-US" sz="3400" spc="-1" strike="noStrike">
               <a:latin typeface="Arial"/>
@@ -4411,19 +4766,19 @@
       </p:grpSpPr>
       <p:pic>
         <p:nvPicPr>
-          <p:cNvPr id="75" name="" descr=""/>
+          <p:cNvPr id="74" name="" descr=""/>
           <p:cNvPicPr/>
           <p:nvPr/>
         </p:nvPicPr>
         <p:blipFill>
           <a:blip r:embed="rId1"/>
-          <a:srcRect l="5364" t="39995" r="0" b="20000"/>
+          <a:srcRect l="5364" t="19526" r="0" b="60159"/>
           <a:stretch/>
         </p:blipFill>
         <p:spPr>
           <a:xfrm>
-            <a:off x="0" y="1890000"/>
-            <a:ext cx="13004640" cy="7863480"/>
+            <a:off x="0" y="2926080"/>
+            <a:ext cx="13004640" cy="3992760"/>
           </a:xfrm>
           <a:prstGeom prst="rect">
             <a:avLst/>
@@ -4435,13 +4790,13 @@
       </p:pic>
       <p:sp>
         <p:nvSpPr>
-          <p:cNvPr id="76" name="TextShape 1"/>
+          <p:cNvPr id="75" name="TextShape 1"/>
           <p:cNvSpPr txBox="1"/>
           <p:nvPr/>
         </p:nvSpPr>
         <p:spPr>
           <a:xfrm>
-            <a:off x="752760" y="852480"/>
+            <a:off x="752400" y="852120"/>
             <a:ext cx="11261880" cy="572040"/>
           </a:xfrm>
           <a:prstGeom prst="rect">
@@ -4464,7 +4819,7 @@
                 <a:latin typeface="Arial-BoldMT"/>
                 <a:ea typeface="Arial-BoldMT"/>
               </a:rPr>
-              <a:t>Results: With Tax</a:t>
+              <a:t>Results: Slightly Unequal Costs Without Tax</a:t>
             </a:r>
             <a:endParaRPr b="0" lang="en-US" sz="3400" spc="-1" strike="noStrike">
               <a:latin typeface="Arial"/>
@@ -4531,19 +4886,19 @@
       </p:grpSpPr>
       <p:pic>
         <p:nvPicPr>
-          <p:cNvPr id="77" name="" descr=""/>
+          <p:cNvPr id="76" name="" descr=""/>
           <p:cNvPicPr/>
           <p:nvPr/>
         </p:nvPicPr>
         <p:blipFill>
           <a:blip r:embed="rId1"/>
-          <a:srcRect l="1753" t="0" r="50077" b="0"/>
+          <a:srcRect l="5364" t="39995" r="0" b="39848"/>
           <a:stretch/>
         </p:blipFill>
         <p:spPr>
           <a:xfrm>
-            <a:off x="457200" y="548640"/>
-            <a:ext cx="12547440" cy="8840160"/>
+            <a:off x="0" y="2987640"/>
+            <a:ext cx="13004640" cy="3961800"/>
           </a:xfrm>
           <a:prstGeom prst="rect">
             <a:avLst/>
@@ -4553,6 +4908,45 @@
           </a:ln>
         </p:spPr>
       </p:pic>
+      <p:sp>
+        <p:nvSpPr>
+          <p:cNvPr id="77" name="TextShape 1"/>
+          <p:cNvSpPr txBox="1"/>
+          <p:nvPr/>
+        </p:nvSpPr>
+        <p:spPr>
+          <a:xfrm>
+            <a:off x="752760" y="852480"/>
+            <a:ext cx="11261880" cy="572040"/>
+          </a:xfrm>
+          <a:prstGeom prst="rect">
+            <a:avLst/>
+          </a:prstGeom>
+          <a:noFill/>
+          <a:ln>
+            <a:noFill/>
+          </a:ln>
+        </p:spPr>
+        <p:txBody>
+          <a:bodyPr lIns="90000" rIns="90000" tIns="45000" bIns="45000"/>
+          <a:p>
+            <a:pPr algn="ctr"/>
+            <a:r>
+              <a:rPr b="1" lang="en-US" sz="3400" spc="-1" strike="noStrike">
+                <a:solidFill>
+                  <a:srgbClr val="164e86"/>
+                </a:solidFill>
+                <a:latin typeface="Arial-BoldMT"/>
+                <a:ea typeface="Arial-BoldMT"/>
+              </a:rPr>
+              <a:t>Results: Equal Costs With Tax</a:t>
+            </a:r>
+            <a:endParaRPr b="0" lang="en-US" sz="3400" spc="-1" strike="noStrike">
+              <a:latin typeface="Arial"/>
+            </a:endParaRPr>
+          </a:p>
+        </p:txBody>
+      </p:sp>
     </p:spTree>
   </p:cSld>
   <mc:AlternateContent>

</xml_diff>